<commit_message>
melhorias de usuabilidade e implementação da regra de termino das horas
</commit_message>
<xml_diff>
--- a/doc/Apresentação-DaHora.pptx
+++ b/doc/Apresentação-DaHora.pptx
@@ -5,10 +5,10 @@
     <p:sldMasterId id="2147483648" r:id="rId1"/>
   </p:sldMasterIdLst>
   <p:notesMasterIdLst>
-    <p:notesMasterId r:id="rId10"/>
+    <p:notesMasterId r:id="rId12"/>
   </p:notesMasterIdLst>
   <p:handoutMasterIdLst>
-    <p:handoutMasterId r:id="rId11"/>
+    <p:handoutMasterId r:id="rId13"/>
   </p:handoutMasterIdLst>
   <p:sldIdLst>
     <p:sldId id="256" r:id="rId2"/>
@@ -19,6 +19,8 @@
     <p:sldId id="260" r:id="rId7"/>
     <p:sldId id="261" r:id="rId8"/>
     <p:sldId id="262" r:id="rId9"/>
+    <p:sldId id="264" r:id="rId10"/>
+    <p:sldId id="265" r:id="rId11"/>
   </p:sldIdLst>
   <p:sldSz cx="12192000" cy="6858000"/>
   <p:notesSz cx="6858000" cy="9144000"/>
@@ -134,6 +136,7 @@
     <p1510:client id="{054B2152-E46D-4DB8-95F8-BB8781C3B1D3}" v="271" dt="2022-04-04T16:30:36.612"/>
     <p1510:client id="{5B921B4C-7F98-2D80-5262-3C80C4AFD076}" v="82" dt="2022-04-04T20:04:09.869"/>
     <p1510:client id="{6F1C8F94-CEE4-AB8C-374C-5E3C3470A969}" v="16" dt="2022-04-04T22:45:39.263"/>
+    <p1510:client id="{EEE4F934-F6A6-40FF-BDF8-6309424163B8}" v="51" dt="2022-05-31T10:58:46.973"/>
   </p1510:revLst>
 </p1510:revInfo>
 </file>
@@ -232,7 +235,7 @@
           <a:p>
             <a:fld id="{1A768782-1892-4033-B3F1-B430C15EFDE6}" type="datetimeFigureOut">
               <a:rPr lang="pt-BR" smtClean="0"/>
-              <a:t>05/04/2022</a:t>
+              <a:t>31/05/2022</a:t>
             </a:fld>
             <a:endParaRPr lang="pt-BR"/>
           </a:p>
@@ -410,7 +413,7 @@
           <a:p>
             <a:fld id="{F40F486B-199A-4784-901C-4DCE88BFC78A}" type="datetimeFigureOut">
               <a:rPr lang="pt-BR" noProof="0" smtClean="0"/>
-              <a:t>05/04/2022</a:t>
+              <a:t>31/05/2022</a:t>
             </a:fld>
             <a:endParaRPr lang="pt-BR" noProof="0"/>
           </a:p>
@@ -932,7 +935,7 @@
             <a:pPr rtl="0"/>
             <a:fld id="{7B4C6B35-BB0C-4D8C-9B34-E7A2A9898500}" type="datetime1">
               <a:rPr lang="pt-BR" noProof="0" smtClean="0"/>
-              <a:t>05/04/2022</a:t>
+              <a:t>31/05/2022</a:t>
             </a:fld>
             <a:endParaRPr lang="pt-BR" noProof="0"/>
           </a:p>
@@ -1260,7 +1263,7 @@
             <a:pPr rtl="0"/>
             <a:fld id="{6B3CE400-7B96-4C05-A740-FFED18F368BA}" type="datetime1">
               <a:rPr lang="pt-BR" noProof="0" smtClean="0"/>
-              <a:t>05/04/2022</a:t>
+              <a:t>31/05/2022</a:t>
             </a:fld>
             <a:endParaRPr lang="pt-BR" noProof="0"/>
           </a:p>
@@ -1437,7 +1440,7 @@
             <a:pPr rtl="0"/>
             <a:fld id="{8CF2B33C-982B-4184-A410-6203C6677C29}" type="datetime1">
               <a:rPr lang="pt-BR" noProof="0" smtClean="0"/>
-              <a:t>05/04/2022</a:t>
+              <a:t>31/05/2022</a:t>
             </a:fld>
             <a:endParaRPr lang="pt-BR" noProof="0"/>
           </a:p>
@@ -1604,7 +1607,7 @@
             <a:pPr rtl="0"/>
             <a:fld id="{6C097780-B878-4C18-AC00-EA752DC0A622}" type="datetime1">
               <a:rPr lang="pt-BR" noProof="0" smtClean="0"/>
-              <a:t>05/04/2022</a:t>
+              <a:t>31/05/2022</a:t>
             </a:fld>
             <a:endParaRPr lang="pt-BR" noProof="0"/>
           </a:p>
@@ -1879,7 +1882,7 @@
             <a:pPr rtl="0"/>
             <a:fld id="{05CA6D25-3388-4494-9EDA-2B82406510CF}" type="datetime1">
               <a:rPr lang="pt-BR" noProof="0" smtClean="0"/>
-              <a:t>05/04/2022</a:t>
+              <a:t>31/05/2022</a:t>
             </a:fld>
             <a:endParaRPr lang="pt-BR" noProof="0"/>
           </a:p>
@@ -2270,7 +2273,7 @@
             <a:pPr rtl="0"/>
             <a:fld id="{19CD8504-2A3B-4404-80B6-3FDCD18BCAD2}" type="datetime1">
               <a:rPr lang="pt-BR" noProof="0" smtClean="0"/>
-              <a:t>05/04/2022</a:t>
+              <a:t>31/05/2022</a:t>
             </a:fld>
             <a:endParaRPr lang="pt-BR" noProof="0"/>
           </a:p>
@@ -2743,7 +2746,7 @@
             <a:pPr rtl="0"/>
             <a:fld id="{431BA83A-F1F3-43AA-AB9B-9E90B0C8A27B}" type="datetime1">
               <a:rPr lang="pt-BR" noProof="0" smtClean="0"/>
-              <a:t>05/04/2022</a:t>
+              <a:t>31/05/2022</a:t>
             </a:fld>
             <a:endParaRPr lang="pt-BR" noProof="0"/>
           </a:p>
@@ -2859,7 +2862,7 @@
             <a:pPr rtl="0"/>
             <a:fld id="{9DB85840-42BC-4007-94FF-71DCADCCA73C}" type="datetime1">
               <a:rPr lang="pt-BR" noProof="0" smtClean="0"/>
-              <a:t>05/04/2022</a:t>
+              <a:t>31/05/2022</a:t>
             </a:fld>
             <a:endParaRPr lang="pt-BR" noProof="0"/>
           </a:p>
@@ -2952,7 +2955,7 @@
             <a:pPr rtl="0"/>
             <a:fld id="{0B042D15-7E3C-49BB-8ED2-1766F94C0730}" type="datetime1">
               <a:rPr lang="pt-BR" noProof="0" smtClean="0"/>
-              <a:t>05/04/2022</a:t>
+              <a:t>31/05/2022</a:t>
             </a:fld>
             <a:endParaRPr lang="pt-BR" noProof="0"/>
           </a:p>
@@ -3295,7 +3298,7 @@
             <a:pPr rtl="0"/>
             <a:fld id="{136C38E3-02CF-4AC1-97B1-A0C2C1ADA248}" type="datetime1">
               <a:rPr lang="pt-BR" noProof="0" smtClean="0"/>
-              <a:t>05/04/2022</a:t>
+              <a:t>31/05/2022</a:t>
             </a:fld>
             <a:endParaRPr lang="pt-BR" noProof="0"/>
           </a:p>
@@ -3682,7 +3685,7 @@
             <a:pPr rtl="0"/>
             <a:fld id="{F906863A-6F6A-4823-B628-B52EA22C4E6F}" type="datetime1">
               <a:rPr lang="pt-BR" noProof="0" smtClean="0"/>
-              <a:t>05/04/2022</a:t>
+              <a:t>31/05/2022</a:t>
             </a:fld>
             <a:endParaRPr lang="pt-BR" noProof="0"/>
           </a:p>
@@ -3958,7 +3961,7 @@
             <a:pPr rtl="0"/>
             <a:fld id="{90A1CB56-ABF5-4901-BAD3-986E66BCF644}" type="datetime1">
               <a:rPr lang="pt-BR" noProof="0" smtClean="0"/>
-              <a:t>05/04/2022</a:t>
+              <a:t>31/05/2022</a:t>
             </a:fld>
             <a:endParaRPr lang="pt-BR" noProof="0"/>
           </a:p>
@@ -4532,6 +4535,511 @@
 </p:sld>
 </file>
 
+<file path=ppt/slides/slide10.xml><?xml version="1.0" encoding="utf-8"?>
+<p:sld xmlns:a="http://schemas.openxmlformats.org/drawingml/2006/main" xmlns:r="http://schemas.openxmlformats.org/officeDocument/2006/relationships" xmlns:p="http://schemas.openxmlformats.org/presentationml/2006/main">
+  <p:cSld>
+    <p:bg>
+      <p:bgPr>
+        <a:solidFill>
+          <a:schemeClr val="bg2"/>
+        </a:solidFill>
+        <a:effectLst/>
+      </p:bgPr>
+    </p:bg>
+    <p:spTree>
+      <p:nvGrpSpPr>
+        <p:cNvPr id="1" name=""/>
+        <p:cNvGrpSpPr/>
+        <p:nvPr/>
+      </p:nvGrpSpPr>
+      <p:grpSpPr>
+        <a:xfrm>
+          <a:off x="0" y="0"/>
+          <a:ext cx="0" cy="0"/>
+          <a:chOff x="0" y="0"/>
+          <a:chExt cx="0" cy="0"/>
+        </a:xfrm>
+      </p:grpSpPr>
+      <p:grpSp>
+        <p:nvGrpSpPr>
+          <p:cNvPr id="24" name="Group 23">
+            <a:extLst>
+              <a:ext uri="{FF2B5EF4-FFF2-40B4-BE49-F238E27FC236}">
+                <a16:creationId xmlns:a16="http://schemas.microsoft.com/office/drawing/2014/main" id="{9D9D6BF1-DFF2-4526-9D13-BF339D8C4163}"/>
+              </a:ext>
+              <a:ext uri="{C183D7F6-B498-43B3-948B-1728B52AA6E4}">
+                <adec:decorative xmlns:adec="http://schemas.microsoft.com/office/drawing/2017/decorative" val="1"/>
+              </a:ext>
+            </a:extLst>
+          </p:cNvPr>
+          <p:cNvGrpSpPr>
+            <a:grpSpLocks noGrp="1" noUngrp="1" noRot="1" noChangeAspect="1" noMove="1" noResize="1"/>
+          </p:cNvGrpSpPr>
+          <p:nvPr>
+            <p:extLst>
+              <p:ext uri="{386F3935-93C4-4BCD-93E2-E3B085C9AB24}">
+                <p16:designElem xmlns:p16="http://schemas.microsoft.com/office/powerpoint/2015/main" val="1"/>
+              </p:ext>
+            </p:extLst>
+          </p:nvPr>
+        </p:nvGrpSpPr>
+        <p:grpSpPr>
+          <a:xfrm>
+            <a:off x="752858" y="744469"/>
+            <a:ext cx="10674117" cy="5349671"/>
+            <a:chOff x="752858" y="744469"/>
+            <a:chExt cx="10674117" cy="5349671"/>
+          </a:xfrm>
+        </p:grpSpPr>
+        <p:sp>
+          <p:nvSpPr>
+            <p:cNvPr id="25" name="Freeform 6">
+              <a:extLst>
+                <a:ext uri="{FF2B5EF4-FFF2-40B4-BE49-F238E27FC236}">
+                  <a16:creationId xmlns:a16="http://schemas.microsoft.com/office/drawing/2014/main" id="{A54D4DB6-FB18-4CAE-8905-E0053C92569E}"/>
+                </a:ext>
+                <a:ext uri="{C183D7F6-B498-43B3-948B-1728B52AA6E4}">
+                  <adec:decorative xmlns:adec="http://schemas.microsoft.com/office/drawing/2017/decorative" val="1"/>
+                </a:ext>
+              </a:extLst>
+            </p:cNvPr>
+            <p:cNvSpPr/>
+            <p:nvPr>
+              <p:extLst>
+                <p:ext uri="{386F3935-93C4-4BCD-93E2-E3B085C9AB24}">
+                  <p16:designElem xmlns:p16="http://schemas.microsoft.com/office/powerpoint/2015/main" val="1"/>
+                </p:ext>
+              </p:extLst>
+            </p:nvPr>
+          </p:nvSpPr>
+          <p:spPr bwMode="auto">
+            <a:xfrm>
+              <a:off x="8151962" y="1685652"/>
+              <a:ext cx="3275013" cy="4408488"/>
+            </a:xfrm>
+            <a:custGeom>
+              <a:avLst/>
+              <a:gdLst/>
+              <a:ahLst/>
+              <a:cxnLst/>
+              <a:rect l="l" t="t" r="r" b="b"/>
+              <a:pathLst>
+                <a:path w="10000" h="10000">
+                  <a:moveTo>
+                    <a:pt x="8761" y="0"/>
+                  </a:moveTo>
+                  <a:lnTo>
+                    <a:pt x="10000" y="0"/>
+                  </a:lnTo>
+                  <a:lnTo>
+                    <a:pt x="10000" y="10000"/>
+                  </a:lnTo>
+                  <a:lnTo>
+                    <a:pt x="0" y="10000"/>
+                  </a:lnTo>
+                  <a:lnTo>
+                    <a:pt x="0" y="9126"/>
+                  </a:lnTo>
+                  <a:lnTo>
+                    <a:pt x="8761" y="9127"/>
+                  </a:lnTo>
+                  <a:lnTo>
+                    <a:pt x="8761" y="0"/>
+                  </a:lnTo>
+                  <a:close/>
+                </a:path>
+              </a:pathLst>
+            </a:custGeom>
+            <a:solidFill>
+              <a:schemeClr val="tx2"/>
+            </a:solidFill>
+            <a:ln w="0">
+              <a:noFill/>
+              <a:prstDash val="solid"/>
+              <a:round/>
+              <a:headEnd/>
+              <a:tailEnd/>
+            </a:ln>
+          </p:spPr>
+        </p:sp>
+        <p:sp>
+          <p:nvSpPr>
+            <p:cNvPr id="26" name="Freeform 6">
+              <a:extLst>
+                <a:ext uri="{FF2B5EF4-FFF2-40B4-BE49-F238E27FC236}">
+                  <a16:creationId xmlns:a16="http://schemas.microsoft.com/office/drawing/2014/main" id="{1DBD6488-9429-4FFA-8AE8-C4022C39B0F2}"/>
+                </a:ext>
+                <a:ext uri="{C183D7F6-B498-43B3-948B-1728B52AA6E4}">
+                  <adec:decorative xmlns:adec="http://schemas.microsoft.com/office/drawing/2017/decorative" val="1"/>
+                </a:ext>
+              </a:extLst>
+            </p:cNvPr>
+            <p:cNvSpPr/>
+            <p:nvPr>
+              <p:extLst>
+                <p:ext uri="{386F3935-93C4-4BCD-93E2-E3B085C9AB24}">
+                  <p16:designElem xmlns:p16="http://schemas.microsoft.com/office/powerpoint/2015/main" val="1"/>
+                </p:ext>
+              </p:extLst>
+            </p:nvPr>
+          </p:nvSpPr>
+          <p:spPr bwMode="auto">
+            <a:xfrm flipH="1" flipV="1">
+              <a:off x="752858" y="744469"/>
+              <a:ext cx="3275668" cy="4408488"/>
+            </a:xfrm>
+            <a:custGeom>
+              <a:avLst/>
+              <a:gdLst/>
+              <a:ahLst/>
+              <a:cxnLst/>
+              <a:rect l="l" t="t" r="r" b="b"/>
+              <a:pathLst>
+                <a:path w="10002" h="10000">
+                  <a:moveTo>
+                    <a:pt x="8763" y="0"/>
+                  </a:moveTo>
+                  <a:lnTo>
+                    <a:pt x="10002" y="0"/>
+                  </a:lnTo>
+                  <a:lnTo>
+                    <a:pt x="10002" y="10000"/>
+                  </a:lnTo>
+                  <a:lnTo>
+                    <a:pt x="2" y="10000"/>
+                  </a:lnTo>
+                  <a:cubicBezTo>
+                    <a:pt x="-2" y="9698"/>
+                    <a:pt x="4" y="9427"/>
+                    <a:pt x="0" y="9125"/>
+                  </a:cubicBezTo>
+                  <a:lnTo>
+                    <a:pt x="8763" y="9128"/>
+                  </a:lnTo>
+                  <a:lnTo>
+                    <a:pt x="8763" y="0"/>
+                  </a:lnTo>
+                  <a:close/>
+                </a:path>
+              </a:pathLst>
+            </a:custGeom>
+            <a:solidFill>
+              <a:schemeClr val="tx2"/>
+            </a:solidFill>
+            <a:ln w="0">
+              <a:noFill/>
+              <a:prstDash val="solid"/>
+              <a:round/>
+              <a:headEnd/>
+              <a:tailEnd/>
+            </a:ln>
+          </p:spPr>
+        </p:sp>
+      </p:grpSp>
+      <p:sp useBgFill="1">
+        <p:nvSpPr>
+          <p:cNvPr id="28" name="Rectangle 27">
+            <a:extLst>
+              <a:ext uri="{FF2B5EF4-FFF2-40B4-BE49-F238E27FC236}">
+                <a16:creationId xmlns:a16="http://schemas.microsoft.com/office/drawing/2014/main" id="{A77A6167-FCC5-49E8-B280-CECAF151ED9F}"/>
+              </a:ext>
+              <a:ext uri="{C183D7F6-B498-43B3-948B-1728B52AA6E4}">
+                <adec:decorative xmlns:adec="http://schemas.microsoft.com/office/drawing/2017/decorative" val="1"/>
+              </a:ext>
+            </a:extLst>
+          </p:cNvPr>
+          <p:cNvSpPr>
+            <a:spLocks noGrp="1" noRot="1" noChangeAspect="1" noMove="1" noResize="1" noEditPoints="1" noAdjustHandles="1" noChangeArrowheads="1" noChangeShapeType="1" noTextEdit="1"/>
+          </p:cNvSpPr>
+          <p:nvPr>
+            <p:extLst>
+              <p:ext uri="{386F3935-93C4-4BCD-93E2-E3B085C9AB24}">
+                <p16:designElem xmlns:p16="http://schemas.microsoft.com/office/powerpoint/2015/main" val="1"/>
+              </p:ext>
+            </p:extLst>
+          </p:nvPr>
+        </p:nvSpPr>
+        <p:spPr bwMode="grayWhite">
+          <a:xfrm>
+            <a:off x="0" y="0"/>
+            <a:ext cx="12192000" cy="6858000"/>
+          </a:xfrm>
+          <a:prstGeom prst="rect">
+            <a:avLst/>
+          </a:prstGeom>
+          <a:ln>
+            <a:noFill/>
+          </a:ln>
+        </p:spPr>
+        <p:style>
+          <a:lnRef idx="2">
+            <a:schemeClr val="accent1">
+              <a:shade val="50000"/>
+            </a:schemeClr>
+          </a:lnRef>
+          <a:fillRef idx="1">
+            <a:schemeClr val="accent1"/>
+          </a:fillRef>
+          <a:effectRef idx="0">
+            <a:schemeClr val="accent1"/>
+          </a:effectRef>
+          <a:fontRef idx="minor">
+            <a:schemeClr val="lt1"/>
+          </a:fontRef>
+        </p:style>
+        <p:txBody>
+          <a:bodyPr rtlCol="0" anchor="ctr"/>
+          <a:lstStyle/>
+          <a:p>
+            <a:pPr algn="ctr"/>
+            <a:endParaRPr lang="en-US"/>
+          </a:p>
+        </p:txBody>
+      </p:sp>
+      <p:sp>
+        <p:nvSpPr>
+          <p:cNvPr id="30" name="Freeform 6">
+            <a:extLst>
+              <a:ext uri="{FF2B5EF4-FFF2-40B4-BE49-F238E27FC236}">
+                <a16:creationId xmlns:a16="http://schemas.microsoft.com/office/drawing/2014/main" id="{F84046EA-4273-437E-9DE5-5AEE713C35E2}"/>
+              </a:ext>
+              <a:ext uri="{C183D7F6-B498-43B3-948B-1728B52AA6E4}">
+                <adec:decorative xmlns:adec="http://schemas.microsoft.com/office/drawing/2017/decorative" val="1"/>
+              </a:ext>
+            </a:extLst>
+          </p:cNvPr>
+          <p:cNvSpPr>
+            <a:spLocks noGrp="1" noRot="1" noChangeAspect="1" noMove="1" noResize="1" noEditPoints="1" noAdjustHandles="1" noChangeArrowheads="1" noChangeShapeType="1" noTextEdit="1"/>
+          </p:cNvSpPr>
+          <p:nvPr>
+            <p:extLst>
+              <p:ext uri="{386F3935-93C4-4BCD-93E2-E3B085C9AB24}">
+                <p16:designElem xmlns:p16="http://schemas.microsoft.com/office/powerpoint/2015/main" val="1"/>
+              </p:ext>
+            </p:extLst>
+          </p:nvPr>
+        </p:nvSpPr>
+        <p:spPr bwMode="auto">
+          <a:xfrm flipH="1" flipV="1">
+            <a:off x="752858" y="744469"/>
+            <a:ext cx="3275668" cy="4408488"/>
+          </a:xfrm>
+          <a:custGeom>
+            <a:avLst/>
+            <a:gdLst/>
+            <a:ahLst/>
+            <a:cxnLst/>
+            <a:rect l="l" t="t" r="r" b="b"/>
+            <a:pathLst>
+              <a:path w="10002" h="10000">
+                <a:moveTo>
+                  <a:pt x="8763" y="0"/>
+                </a:moveTo>
+                <a:lnTo>
+                  <a:pt x="10002" y="0"/>
+                </a:lnTo>
+                <a:lnTo>
+                  <a:pt x="10002" y="10000"/>
+                </a:lnTo>
+                <a:lnTo>
+                  <a:pt x="2" y="10000"/>
+                </a:lnTo>
+                <a:cubicBezTo>
+                  <a:pt x="-2" y="9698"/>
+                  <a:pt x="4" y="9427"/>
+                  <a:pt x="0" y="9125"/>
+                </a:cubicBezTo>
+                <a:lnTo>
+                  <a:pt x="8763" y="9128"/>
+                </a:lnTo>
+                <a:lnTo>
+                  <a:pt x="8763" y="0"/>
+                </a:lnTo>
+                <a:close/>
+              </a:path>
+            </a:pathLst>
+          </a:custGeom>
+          <a:solidFill>
+            <a:schemeClr val="tx2"/>
+          </a:solidFill>
+          <a:ln w="0">
+            <a:noFill/>
+            <a:prstDash val="solid"/>
+            <a:round/>
+            <a:headEnd/>
+            <a:tailEnd/>
+          </a:ln>
+        </p:spPr>
+      </p:sp>
+      <p:sp>
+        <p:nvSpPr>
+          <p:cNvPr id="2" name="Título 1">
+            <a:extLst>
+              <a:ext uri="{FF2B5EF4-FFF2-40B4-BE49-F238E27FC236}">
+                <a16:creationId xmlns:a16="http://schemas.microsoft.com/office/drawing/2014/main" id="{DE5ACD69-2EFE-BFC8-EAE1-76723B0EC4CF}"/>
+              </a:ext>
+            </a:extLst>
+          </p:cNvPr>
+          <p:cNvSpPr>
+            <a:spLocks noGrp="1"/>
+          </p:cNvSpPr>
+          <p:nvPr>
+            <p:ph type="title"/>
+          </p:nvPr>
+        </p:nvSpPr>
+        <p:spPr>
+          <a:xfrm>
+            <a:off x="1478522" y="1480930"/>
+            <a:ext cx="5301138" cy="3254321"/>
+          </a:xfrm>
+        </p:spPr>
+        <p:txBody>
+          <a:bodyPr vert="horz" lIns="91440" tIns="45720" rIns="91440" bIns="45720" rtlCol="0" anchor="b">
+            <a:normAutofit/>
+          </a:bodyPr>
+          <a:lstStyle/>
+          <a:p>
+            <a:r>
+              <a:rPr lang="en-US" sz="5600" cap="all"/>
+              <a:t>APRESENTAÇÃO DO APLICATIVO</a:t>
+            </a:r>
+          </a:p>
+        </p:txBody>
+      </p:sp>
+      <p:pic>
+        <p:nvPicPr>
+          <p:cNvPr id="20" name="Picture 19" descr="Pessoa observando o telefone vazio">
+            <a:extLst>
+              <a:ext uri="{FF2B5EF4-FFF2-40B4-BE49-F238E27FC236}">
+                <a16:creationId xmlns:a16="http://schemas.microsoft.com/office/drawing/2014/main" id="{4BBF72F8-DEB6-3FE4-3844-506E21A63F8C}"/>
+              </a:ext>
+            </a:extLst>
+          </p:cNvPr>
+          <p:cNvPicPr>
+            <a:picLocks noChangeAspect="1"/>
+          </p:cNvPicPr>
+          <p:nvPr/>
+        </p:nvPicPr>
+        <p:blipFill rotWithShape="1">
+          <a:blip r:embed="rId2"/>
+          <a:srcRect l="42555" r="9140" b="-10"/>
+          <a:stretch/>
+        </p:blipFill>
+        <p:spPr>
+          <a:xfrm>
+            <a:off x="7225748" y="10"/>
+            <a:ext cx="4966252" cy="6857990"/>
+          </a:xfrm>
+          <a:prstGeom prst="rect">
+            <a:avLst/>
+          </a:prstGeom>
+        </p:spPr>
+      </p:pic>
+    </p:spTree>
+    <p:extLst>
+      <p:ext uri="{BB962C8B-B14F-4D97-AF65-F5344CB8AC3E}">
+        <p14:creationId xmlns:p14="http://schemas.microsoft.com/office/powerpoint/2010/main" val="1067402162"/>
+      </p:ext>
+    </p:extLst>
+  </p:cSld>
+  <p:clrMapOvr>
+    <a:overrideClrMapping bg1="dk1" tx1="lt1" bg2="dk2" tx2="lt2" accent1="accent1" accent2="accent2" accent3="accent3" accent4="accent4" accent5="accent5" accent6="accent6" hlink="hlink" folHlink="folHlink"/>
+  </p:clrMapOvr>
+  <p:timing>
+    <p:tnLst>
+      <p:par>
+        <p:cTn id="1" dur="indefinite" restart="never" nodeType="tmRoot">
+          <p:childTnLst>
+            <p:seq concurrent="1" nextAc="seek">
+              <p:cTn id="2" dur="indefinite" nodeType="mainSeq">
+                <p:childTnLst>
+                  <p:par>
+                    <p:cTn id="3" fill="hold">
+                      <p:stCondLst>
+                        <p:cond delay="indefinite"/>
+                        <p:cond evt="onBegin" delay="0">
+                          <p:tn val="2"/>
+                        </p:cond>
+                      </p:stCondLst>
+                      <p:childTnLst>
+                        <p:par>
+                          <p:cTn id="4" fill="hold">
+                            <p:stCondLst>
+                              <p:cond delay="0"/>
+                            </p:stCondLst>
+                            <p:childTnLst>
+                              <p:par>
+                                <p:cTn id="5" presetID="10" presetClass="entr" presetSubtype="0" fill="hold" grpId="0" nodeType="withEffect">
+                                  <p:stCondLst>
+                                    <p:cond delay="1000"/>
+                                  </p:stCondLst>
+                                  <p:iterate>
+                                    <p:tmPct val="10000"/>
+                                  </p:iterate>
+                                  <p:childTnLst>
+                                    <p:set>
+                                      <p:cBhvr>
+                                        <p:cTn id="6" dur="1" fill="hold">
+                                          <p:stCondLst>
+                                            <p:cond delay="0"/>
+                                          </p:stCondLst>
+                                        </p:cTn>
+                                        <p:tgtEl>
+                                          <p:spTgt spid="2"/>
+                                        </p:tgtEl>
+                                        <p:attrNameLst>
+                                          <p:attrName>style.visibility</p:attrName>
+                                        </p:attrNameLst>
+                                      </p:cBhvr>
+                                      <p:to>
+                                        <p:strVal val="visible"/>
+                                      </p:to>
+                                    </p:set>
+                                    <p:animEffect transition="in" filter="fade">
+                                      <p:cBhvr>
+                                        <p:cTn id="7" dur="700"/>
+                                        <p:tgtEl>
+                                          <p:spTgt spid="2"/>
+                                        </p:tgtEl>
+                                      </p:cBhvr>
+                                    </p:animEffect>
+                                  </p:childTnLst>
+                                </p:cTn>
+                              </p:par>
+                            </p:childTnLst>
+                          </p:cTn>
+                        </p:par>
+                      </p:childTnLst>
+                    </p:cTn>
+                  </p:par>
+                </p:childTnLst>
+              </p:cTn>
+              <p:prevCondLst>
+                <p:cond evt="onPrev" delay="0">
+                  <p:tgtEl>
+                    <p:sldTgt/>
+                  </p:tgtEl>
+                </p:cond>
+              </p:prevCondLst>
+              <p:nextCondLst>
+                <p:cond evt="onNext" delay="0">
+                  <p:tgtEl>
+                    <p:sldTgt/>
+                  </p:tgtEl>
+                </p:cond>
+              </p:nextCondLst>
+            </p:seq>
+          </p:childTnLst>
+        </p:cTn>
+      </p:par>
+    </p:tnLst>
+    <p:bldLst>
+      <p:bldP spid="2" grpId="0"/>
+    </p:bldLst>
+  </p:timing>
+</p:sld>
+</file>
+
 <file path=ppt/slides/slide2.xml><?xml version="1.0" encoding="utf-8"?>
 <p:sld xmlns:a="http://schemas.openxmlformats.org/drawingml/2006/main" xmlns:r="http://schemas.openxmlformats.org/officeDocument/2006/relationships" xmlns:p="http://schemas.openxmlformats.org/presentationml/2006/main">
   <p:cSld>
@@ -6824,35 +7332,190 @@
           </a:p>
         </p:txBody>
       </p:sp>
-      <p:sp>
-        <p:nvSpPr>
-          <p:cNvPr id="3" name="Espaço Reservado para Conteúdo 2">
+      <p:pic>
+        <p:nvPicPr>
+          <p:cNvPr id="4" name="Imagem 4" descr="Interface gráfica do usuário, Aplicativo&#10;&#10;Descrição gerada automaticamente">
             <a:extLst>
               <a:ext uri="{FF2B5EF4-FFF2-40B4-BE49-F238E27FC236}">
-                <a16:creationId xmlns:a16="http://schemas.microsoft.com/office/drawing/2014/main" id="{4C4677C6-1FE8-E10A-949E-250E3682838D}"/>
+                <a16:creationId xmlns:a16="http://schemas.microsoft.com/office/drawing/2014/main" id="{C3E5C072-3566-0BEE-596E-D9C22EA9E9A4}"/>
               </a:ext>
             </a:extLst>
           </p:cNvPr>
-          <p:cNvSpPr>
-            <a:spLocks noGrp="1"/>
-          </p:cNvSpPr>
+          <p:cNvPicPr>
+            <a:picLocks noGrp="1" noChangeAspect="1"/>
+          </p:cNvPicPr>
           <p:nvPr>
             <p:ph idx="1"/>
           </p:nvPr>
-        </p:nvSpPr>
-        <p:spPr/>
-        <p:txBody>
-          <a:bodyPr/>
-          <a:lstStyle/>
-          <a:p>
-            <a:endParaRPr lang="pt-BR"/>
-          </a:p>
-        </p:txBody>
-      </p:sp>
+        </p:nvPicPr>
+        <p:blipFill>
+          <a:blip r:embed="rId2"/>
+          <a:stretch>
+            <a:fillRect/>
+          </a:stretch>
+        </p:blipFill>
+        <p:spPr>
+          <a:xfrm>
+            <a:off x="3303625" y="1626055"/>
+            <a:ext cx="2186458" cy="4730086"/>
+          </a:xfrm>
+        </p:spPr>
+      </p:pic>
+      <p:pic>
+        <p:nvPicPr>
+          <p:cNvPr id="5" name="Imagem 5" descr="Interface gráfica do usuário, Aplicativo&#10;&#10;Descrição gerada automaticamente">
+            <a:extLst>
+              <a:ext uri="{FF2B5EF4-FFF2-40B4-BE49-F238E27FC236}">
+                <a16:creationId xmlns:a16="http://schemas.microsoft.com/office/drawing/2014/main" id="{6F2462A5-6789-CBCF-1FD3-8EEFD15787CF}"/>
+              </a:ext>
+            </a:extLst>
+          </p:cNvPr>
+          <p:cNvPicPr>
+            <a:picLocks noChangeAspect="1"/>
+          </p:cNvPicPr>
+          <p:nvPr/>
+        </p:nvPicPr>
+        <p:blipFill>
+          <a:blip r:embed="rId3"/>
+          <a:stretch>
+            <a:fillRect/>
+          </a:stretch>
+        </p:blipFill>
+        <p:spPr>
+          <a:xfrm>
+            <a:off x="7705980" y="1621809"/>
+            <a:ext cx="2205026" cy="4740322"/>
+          </a:xfrm>
+          <a:prstGeom prst="rect">
+            <a:avLst/>
+          </a:prstGeom>
+        </p:spPr>
+      </p:pic>
     </p:spTree>
     <p:extLst>
       <p:ext uri="{BB962C8B-B14F-4D97-AF65-F5344CB8AC3E}">
         <p14:creationId xmlns:p14="http://schemas.microsoft.com/office/powerpoint/2010/main" val="3514304492"/>
+      </p:ext>
+    </p:extLst>
+  </p:cSld>
+  <p:clrMapOvr>
+    <a:masterClrMapping/>
+  </p:clrMapOvr>
+</p:sld>
+</file>
+
+<file path=ppt/slides/slide9.xml><?xml version="1.0" encoding="utf-8"?>
+<p:sld xmlns:a="http://schemas.openxmlformats.org/drawingml/2006/main" xmlns:r="http://schemas.openxmlformats.org/officeDocument/2006/relationships" xmlns:p="http://schemas.openxmlformats.org/presentationml/2006/main">
+  <p:cSld>
+    <p:spTree>
+      <p:nvGrpSpPr>
+        <p:cNvPr id="1" name=""/>
+        <p:cNvGrpSpPr/>
+        <p:nvPr/>
+      </p:nvGrpSpPr>
+      <p:grpSpPr>
+        <a:xfrm>
+          <a:off x="0" y="0"/>
+          <a:ext cx="0" cy="0"/>
+          <a:chOff x="0" y="0"/>
+          <a:chExt cx="0" cy="0"/>
+        </a:xfrm>
+      </p:grpSpPr>
+      <p:sp>
+        <p:nvSpPr>
+          <p:cNvPr id="2" name="Título 1">
+            <a:extLst>
+              <a:ext uri="{FF2B5EF4-FFF2-40B4-BE49-F238E27FC236}">
+                <a16:creationId xmlns:a16="http://schemas.microsoft.com/office/drawing/2014/main" id="{EDCD7284-A6B2-F236-982A-131073429F1A}"/>
+              </a:ext>
+            </a:extLst>
+          </p:cNvPr>
+          <p:cNvSpPr>
+            <a:spLocks noGrp="1"/>
+          </p:cNvSpPr>
+          <p:nvPr>
+            <p:ph type="title"/>
+          </p:nvPr>
+        </p:nvSpPr>
+        <p:spPr/>
+        <p:txBody>
+          <a:bodyPr/>
+          <a:lstStyle/>
+          <a:p>
+            <a:r>
+              <a:rPr lang="pt-BR" dirty="0"/>
+              <a:t>Telas</a:t>
+            </a:r>
+            <a:br>
+              <a:rPr lang="pt-BR" dirty="0"/>
+            </a:br>
+            <a:endParaRPr lang="pt-BR" dirty="0"/>
+          </a:p>
+        </p:txBody>
+      </p:sp>
+      <p:pic>
+        <p:nvPicPr>
+          <p:cNvPr id="7" name="Imagem 7" descr="Gráfico&#10;&#10;Descrição gerada automaticamente">
+            <a:extLst>
+              <a:ext uri="{FF2B5EF4-FFF2-40B4-BE49-F238E27FC236}">
+                <a16:creationId xmlns:a16="http://schemas.microsoft.com/office/drawing/2014/main" id="{342F7CD5-D91C-1603-A94F-1E02ECCCC482}"/>
+              </a:ext>
+            </a:extLst>
+          </p:cNvPr>
+          <p:cNvPicPr>
+            <a:picLocks noGrp="1" noChangeAspect="1"/>
+          </p:cNvPicPr>
+          <p:nvPr>
+            <p:ph idx="1"/>
+          </p:nvPr>
+        </p:nvPicPr>
+        <p:blipFill>
+          <a:blip r:embed="rId2"/>
+          <a:stretch>
+            <a:fillRect/>
+          </a:stretch>
+        </p:blipFill>
+        <p:spPr>
+          <a:xfrm>
+            <a:off x="3242210" y="1592239"/>
+            <a:ext cx="2243323" cy="4866563"/>
+          </a:xfrm>
+        </p:spPr>
+      </p:pic>
+      <p:pic>
+        <p:nvPicPr>
+          <p:cNvPr id="8" name="Imagem 8" descr="Interface gráfica do usuário, Texto, Aplicativo&#10;&#10;Descrição gerada automaticamente">
+            <a:extLst>
+              <a:ext uri="{FF2B5EF4-FFF2-40B4-BE49-F238E27FC236}">
+                <a16:creationId xmlns:a16="http://schemas.microsoft.com/office/drawing/2014/main" id="{EE5CED82-D5DC-E7E1-6211-85F71FF9C0C5}"/>
+              </a:ext>
+            </a:extLst>
+          </p:cNvPr>
+          <p:cNvPicPr>
+            <a:picLocks noChangeAspect="1"/>
+          </p:cNvPicPr>
+          <p:nvPr/>
+        </p:nvPicPr>
+        <p:blipFill>
+          <a:blip r:embed="rId3"/>
+          <a:stretch>
+            <a:fillRect/>
+          </a:stretch>
+        </p:blipFill>
+        <p:spPr>
+          <a:xfrm>
+            <a:off x="7683234" y="1587690"/>
+            <a:ext cx="2250519" cy="4876799"/>
+          </a:xfrm>
+          <a:prstGeom prst="rect">
+            <a:avLst/>
+          </a:prstGeom>
+        </p:spPr>
+      </p:pic>
+    </p:spTree>
+    <p:extLst>
+      <p:ext uri="{BB962C8B-B14F-4D97-AF65-F5344CB8AC3E}">
+        <p14:creationId xmlns:p14="http://schemas.microsoft.com/office/powerpoint/2010/main" val="2494314273"/>
       </p:ext>
     </p:extLst>
   </p:cSld>

</xml_diff>